<commit_message>
deleted requirements info from slide deck
</commit_message>
<xml_diff>
--- a/Project2Wine Deck.pptx
+++ b/Project2Wine Deck.pptx
@@ -5,17 +5,16 @@
     <p:sldMasterId id="2147483661" r:id="rId1"/>
   </p:sldMasterIdLst>
   <p:notesMasterIdLst>
-    <p:notesMasterId r:id="rId10"/>
+    <p:notesMasterId r:id="rId9"/>
   </p:notesMasterIdLst>
   <p:sldIdLst>
     <p:sldId id="256" r:id="rId2"/>
-    <p:sldId id="258" r:id="rId3"/>
-    <p:sldId id="257" r:id="rId4"/>
-    <p:sldId id="259" r:id="rId5"/>
-    <p:sldId id="264" r:id="rId6"/>
-    <p:sldId id="261" r:id="rId7"/>
-    <p:sldId id="265" r:id="rId8"/>
-    <p:sldId id="263" r:id="rId9"/>
+    <p:sldId id="257" r:id="rId3"/>
+    <p:sldId id="259" r:id="rId4"/>
+    <p:sldId id="264" r:id="rId5"/>
+    <p:sldId id="261" r:id="rId6"/>
+    <p:sldId id="265" r:id="rId7"/>
+    <p:sldId id="263" r:id="rId8"/>
   </p:sldIdLst>
   <p:sldSz cx="12192000" cy="6858000"/>
   <p:notesSz cx="6858000" cy="9144000"/>
@@ -3905,14 +3904,14 @@
     <dgm:cxn modelId="{724B2135-AB44-46DC-8B6A-A5D10F91B60D}" srcId="{25F25C04-4BF8-41DF-ADD6-BECE905D6F8F}" destId="{F0DDED25-6E66-4475-8E9E-CFD798C46A08}" srcOrd="1" destOrd="0" parTransId="{76E3ADB8-4CEC-428D-B531-458968A623F0}" sibTransId="{38382D8D-7C5A-4F3B-858E-21BB08D3BA67}"/>
     <dgm:cxn modelId="{F939773D-EBB1-4FA5-8920-BA62103DA794}" srcId="{B9B86FCF-B84F-4108-BBC2-E6B959844F5F}" destId="{6F63E164-2071-45AC-954A-6B33F7123375}" srcOrd="0" destOrd="0" parTransId="{02590732-4FCC-4B81-9ECA-DA4D42824C81}" sibTransId="{4A7B8D57-3AF8-4AEE-87E5-DBAFEE44AF5C}"/>
     <dgm:cxn modelId="{91FDBD40-EFEF-48A4-9A4F-A157DDF75C6C}" type="presOf" srcId="{AB28A09E-D6A6-4A87-85D8-6157C47F6F07}" destId="{7AC807BB-C630-4A47-B2AD-4039DB094362}" srcOrd="0" destOrd="0" presId="urn:microsoft.com/office/officeart/2005/8/layout/hierarchy3"/>
+    <dgm:cxn modelId="{704A9D5B-C3F9-4837-8757-81DDB2C4F1E3}" type="presOf" srcId="{F205785A-AE2E-410B-9AA6-F9EB94138DBD}" destId="{3A75E35C-2EFD-466D-AB4D-37C10B765D81}" srcOrd="0" destOrd="0" presId="urn:microsoft.com/office/officeart/2005/8/layout/hierarchy3"/>
+    <dgm:cxn modelId="{20D1E568-22AB-4DEE-936B-E75561E03C40}" type="presOf" srcId="{25F25C04-4BF8-41DF-ADD6-BECE905D6F8F}" destId="{6E018C1B-BF5F-4FA7-8083-22D379A00872}" srcOrd="1" destOrd="0" presId="urn:microsoft.com/office/officeart/2005/8/layout/hierarchy3"/>
+    <dgm:cxn modelId="{1F51116E-8112-4923-A26E-D85ECACB5858}" type="presOf" srcId="{35F6CF09-AF43-4681-8DBF-3DD22871738F}" destId="{F831E3ED-B2B0-4E51-9E46-6A8193070083}" srcOrd="0" destOrd="0" presId="urn:microsoft.com/office/officeart/2005/8/layout/hierarchy3"/>
     <dgm:cxn modelId="{200E864E-678A-44CC-BCBB-17D1428C097E}" type="presOf" srcId="{B9B86FCF-B84F-4108-BBC2-E6B959844F5F}" destId="{A48DB5CF-C9F9-416E-9522-DB4AA8E9348D}" srcOrd="0" destOrd="0" presId="urn:microsoft.com/office/officeart/2005/8/layout/hierarchy3"/>
     <dgm:cxn modelId="{1ED01F4F-DABA-48AD-BAB1-5782D5C29EBF}" type="presOf" srcId="{EA3A5FB5-3635-4163-82E8-36E9A7EC0DD6}" destId="{D00D0978-916D-4516-A5F0-9BA5AFDA0BD3}" srcOrd="0" destOrd="0" presId="urn:microsoft.com/office/officeart/2005/8/layout/hierarchy3"/>
     <dgm:cxn modelId="{BFC1394F-378F-4F72-9161-68B4DEDF3725}" type="presOf" srcId="{6F63E164-2071-45AC-954A-6B33F7123375}" destId="{3BCFAAED-1FE1-40A4-B383-8EA6A3841346}" srcOrd="0" destOrd="0" presId="urn:microsoft.com/office/officeart/2005/8/layout/hierarchy3"/>
     <dgm:cxn modelId="{1AAFE754-D9E9-494F-87B8-AC6412EC60B1}" type="presOf" srcId="{BC1F9E59-81C9-43B2-8D93-3123FAF51B2C}" destId="{6614D3E5-FF0C-4CA5-A471-941BA0AC7BF5}" srcOrd="0" destOrd="0" presId="urn:microsoft.com/office/officeart/2005/8/layout/hierarchy3"/>
     <dgm:cxn modelId="{9F9D1057-1B9C-4EEB-9911-7B7E591E0E1A}" type="presOf" srcId="{D6E9C51F-BC2D-42E6-B199-2EB5680D549A}" destId="{AB96D723-F310-411A-85B6-648D6A13427F}" srcOrd="0" destOrd="0" presId="urn:microsoft.com/office/officeart/2005/8/layout/hierarchy3"/>
-    <dgm:cxn modelId="{704A9D5B-C3F9-4837-8757-81DDB2C4F1E3}" type="presOf" srcId="{F205785A-AE2E-410B-9AA6-F9EB94138DBD}" destId="{3A75E35C-2EFD-466D-AB4D-37C10B765D81}" srcOrd="0" destOrd="0" presId="urn:microsoft.com/office/officeart/2005/8/layout/hierarchy3"/>
-    <dgm:cxn modelId="{20D1E568-22AB-4DEE-936B-E75561E03C40}" type="presOf" srcId="{25F25C04-4BF8-41DF-ADD6-BECE905D6F8F}" destId="{6E018C1B-BF5F-4FA7-8083-22D379A00872}" srcOrd="1" destOrd="0" presId="urn:microsoft.com/office/officeart/2005/8/layout/hierarchy3"/>
-    <dgm:cxn modelId="{1F51116E-8112-4923-A26E-D85ECACB5858}" type="presOf" srcId="{35F6CF09-AF43-4681-8DBF-3DD22871738F}" destId="{F831E3ED-B2B0-4E51-9E46-6A8193070083}" srcOrd="0" destOrd="0" presId="urn:microsoft.com/office/officeart/2005/8/layout/hierarchy3"/>
     <dgm:cxn modelId="{4C139189-E8ED-4B5D-81DA-27A02EA2790D}" type="presOf" srcId="{25F25C04-4BF8-41DF-ADD6-BECE905D6F8F}" destId="{B7B32C6C-ECA4-4CD7-839E-B64193FAF805}" srcOrd="0" destOrd="0" presId="urn:microsoft.com/office/officeart/2005/8/layout/hierarchy3"/>
     <dgm:cxn modelId="{9E530FA5-B6AB-4A9B-AC2B-CDD43650F3C6}" srcId="{B9B86FCF-B84F-4108-BBC2-E6B959844F5F}" destId="{EA13FE5E-0FC8-4548-9871-517CC1B6EDDE}" srcOrd="2" destOrd="0" parTransId="{E93673A9-8DE7-4C95-86C7-8D0906D11782}" sibTransId="{8C978C9A-457B-4EF3-A32B-07BCA4A0EE35}"/>
     <dgm:cxn modelId="{3FD00CC0-35CE-4EF1-AC37-5A1371D456A0}" type="presOf" srcId="{EA13FE5E-0FC8-4548-9871-517CC1B6EDDE}" destId="{7918031C-83FD-4210-9AD7-CDA0028F8ACA}" srcOrd="0" destOrd="0" presId="urn:microsoft.com/office/officeart/2005/8/layout/hierarchy3"/>
@@ -4406,8 +4405,8 @@
     <dgm:cxn modelId="{D81A532D-E4EC-4074-B9C3-0F0C49B4244B}" type="presOf" srcId="{88590F61-07C9-42A2-902A-4F3482AF4637}" destId="{954BEA94-5BCC-4C6E-B245-DFEB7DA5D079}" srcOrd="0" destOrd="0" presId="urn:microsoft.com/office/officeart/2005/8/layout/list1"/>
     <dgm:cxn modelId="{7C21B52E-3299-4B58-81D6-77DC52DE0CD9}" type="presOf" srcId="{2032C68E-4C11-4E1C-AF05-E71F16336440}" destId="{2FE3119F-B07F-4644-89C9-A5B96880057D}" srcOrd="0" destOrd="1" presId="urn:microsoft.com/office/officeart/2005/8/layout/list1"/>
     <dgm:cxn modelId="{5866073E-A533-4C1D-A62D-B778AE57A8B9}" type="presOf" srcId="{D2A1135D-EB37-4CD9-9C00-75B2F100AAD9}" destId="{60849CCD-3264-4682-8D05-DF9D48E8F32E}" srcOrd="0" destOrd="0" presId="urn:microsoft.com/office/officeart/2005/8/layout/list1"/>
+    <dgm:cxn modelId="{6C33C764-9603-4E90-AB53-4C96BD01C472}" type="presOf" srcId="{F95D727D-DB27-410E-A997-0975013EB940}" destId="{B328FEED-7584-48D3-BC96-8B35DC1BAD40}" srcOrd="0" destOrd="0" presId="urn:microsoft.com/office/officeart/2005/8/layout/list1"/>
     <dgm:cxn modelId="{4F98DF48-C5CF-4BA6-8AE9-A1D734C9F4ED}" type="presOf" srcId="{BE31D77B-5166-4387-82E4-1B3F63E569AD}" destId="{067D6240-0FA7-44BC-B07B-5AB851D4A7B6}" srcOrd="1" destOrd="0" presId="urn:microsoft.com/office/officeart/2005/8/layout/list1"/>
-    <dgm:cxn modelId="{6C33C764-9603-4E90-AB53-4C96BD01C472}" type="presOf" srcId="{F95D727D-DB27-410E-A997-0975013EB940}" destId="{B328FEED-7584-48D3-BC96-8B35DC1BAD40}" srcOrd="0" destOrd="0" presId="urn:microsoft.com/office/officeart/2005/8/layout/list1"/>
     <dgm:cxn modelId="{A799136C-C0AA-477E-AA15-0C45619F65A6}" srcId="{BE31D77B-5166-4387-82E4-1B3F63E569AD}" destId="{718BF00B-6792-49A3-B082-F7E2D9FC499B}" srcOrd="1" destOrd="0" parTransId="{85176F3B-98BE-4EA7-8487-EF7D34429A94}" sibTransId="{391B6A42-AC7B-46BB-B610-A591FDD03FCC}"/>
     <dgm:cxn modelId="{A304BE73-4052-477B-BC1F-FC21DFE9D81D}" srcId="{F95D727D-DB27-410E-A997-0975013EB940}" destId="{2032C68E-4C11-4E1C-AF05-E71F16336440}" srcOrd="1" destOrd="0" parTransId="{E8438D43-958B-493F-AC8C-5CD9C8AF94FC}" sibTransId="{C9DE2272-C0E8-47CE-9F0E-92CBC3165F36}"/>
     <dgm:cxn modelId="{01B77578-4B16-4E69-B0B6-E0EF8E66A4D3}" srcId="{88590F61-07C9-42A2-902A-4F3482AF4637}" destId="{921FE030-3B91-4740-93CB-BF3FE7E465D1}" srcOrd="0" destOrd="0" parTransId="{773098DB-99DE-4764-A6F0-4E930C7C53F9}" sibTransId="{5D4BA382-65E0-473A-B1C2-7E8CC153E4EA}"/>
@@ -4944,9 +4943,9 @@
     <dgm:cxn modelId="{AD83FE15-6DFF-4919-B6B4-11E4D1712A7C}" type="presOf" srcId="{7CA7BEBE-93E8-48F3-ADCC-66481981F859}" destId="{046C8F6B-4117-48F3-973E-630D8BB37D11}" srcOrd="0" destOrd="0" presId="urn:microsoft.com/office/officeart/2018/2/layout/IconVerticalSolidList"/>
     <dgm:cxn modelId="{C45D1616-5585-4EB8-AE85-C61730D0A898}" type="presOf" srcId="{CFBE131F-738E-4FA7-9E26-01B04D565116}" destId="{0C2AC07C-CA9B-4767-99F4-47C08AA105E7}" srcOrd="0" destOrd="0" presId="urn:microsoft.com/office/officeart/2018/2/layout/IconVerticalSolidList"/>
     <dgm:cxn modelId="{18658918-DDA0-4583-8AC3-D4E321C23022}" type="presOf" srcId="{245B1223-25C4-4CC3-A5D0-B9043CDCDA54}" destId="{D4ADA138-9E6E-4604-88DD-B762AF5FCA8B}" srcOrd="0" destOrd="0" presId="urn:microsoft.com/office/officeart/2018/2/layout/IconVerticalSolidList"/>
-    <dgm:cxn modelId="{63064257-A79C-48CD-AB5C-2FECBB1F6EE3}" type="presOf" srcId="{64A3BA52-48EE-425C-AA01-EBCD4CB8E4D4}" destId="{5DBA82B5-4583-48E0-B57F-CC50A58AF98D}" srcOrd="0" destOrd="0" presId="urn:microsoft.com/office/officeart/2018/2/layout/IconVerticalSolidList"/>
     <dgm:cxn modelId="{3E376E60-6B58-46F0-83A4-5906E6E3AFC2}" srcId="{8C66E059-E1FC-46D8-8BBF-76F099686917}" destId="{7CA7BEBE-93E8-48F3-ADCC-66481981F859}" srcOrd="0" destOrd="0" parTransId="{01F2C2F3-23D4-41C5-9DD1-C551EAF27DBF}" sibTransId="{FFEEAC77-3AA5-43E3-802D-93FB9067B7A6}"/>
     <dgm:cxn modelId="{F35DFF6D-BB5D-4466-BD27-8A52215B14EE}" srcId="{8C66E059-E1FC-46D8-8BBF-76F099686917}" destId="{08F701D6-8937-4EED-B3D6-47AA08806A75}" srcOrd="4" destOrd="0" parTransId="{08332FCB-9618-4AAC-A2C3-11B3565DC4B6}" sibTransId="{5D424912-5553-4E18-94D0-7836900334D7}"/>
+    <dgm:cxn modelId="{63064257-A79C-48CD-AB5C-2FECBB1F6EE3}" type="presOf" srcId="{64A3BA52-48EE-425C-AA01-EBCD4CB8E4D4}" destId="{5DBA82B5-4583-48E0-B57F-CC50A58AF98D}" srcOrd="0" destOrd="0" presId="urn:microsoft.com/office/officeart/2018/2/layout/IconVerticalSolidList"/>
     <dgm:cxn modelId="{0461CE7A-5290-4EF1-8726-0026CA8BA996}" srcId="{8C66E059-E1FC-46D8-8BBF-76F099686917}" destId="{CFBE131F-738E-4FA7-9E26-01B04D565116}" srcOrd="1" destOrd="0" parTransId="{BFD11FBF-D931-4B68-B434-2B21FC091E84}" sibTransId="{6C7EC849-AC2F-42D1-AC11-B5FC4409AC8F}"/>
     <dgm:cxn modelId="{0953347C-4A69-4788-86F2-139F97F33026}" srcId="{8C66E059-E1FC-46D8-8BBF-76F099686917}" destId="{64A3BA52-48EE-425C-AA01-EBCD4CB8E4D4}" srcOrd="3" destOrd="0" parTransId="{EBF154DA-67CB-449E-8DA3-D758A4AB6FA6}" sibTransId="{5EE70908-4D6D-47C3-AD0A-DB41B6F36F9E}"/>
     <dgm:cxn modelId="{27363B9C-198A-4EFC-BBBB-24491F65DD25}" type="presOf" srcId="{08F701D6-8937-4EED-B3D6-47AA08806A75}" destId="{EFDCE440-4B10-490E-8472-8E9F0EE28262}" srcOrd="0" destOrd="0" presId="urn:microsoft.com/office/officeart/2018/2/layout/IconVerticalSolidList"/>
@@ -14251,7 +14250,7 @@
           <a:p>
             <a:fld id="{97CC861B-9AB0-4556-B727-DBC0BF8311F3}" type="datetimeFigureOut">
               <a:rPr lang="en-US" smtClean="0"/>
-              <a:t>5/22/19</a:t>
+              <a:t>5/23/2019</a:t>
             </a:fld>
             <a:endParaRPr lang="en-US"/>
           </a:p>
@@ -14712,7 +14711,7 @@
           <a:p>
             <a:fld id="{F6C7651C-60AD-421D-9AD2-B6B419D2C3E0}" type="slidenum">
               <a:rPr lang="en-US" smtClean="0"/>
-              <a:t>7</a:t>
+              <a:t>6</a:t>
             </a:fld>
             <a:endParaRPr lang="en-US"/>
           </a:p>
@@ -18295,7 +18294,7 @@
           <a:p>
             <a:fld id="{6AD6EE87-EBD5-4F12-A48A-63ACA297AC8F}" type="datetimeFigureOut">
               <a:rPr lang="en-US" smtClean="0"/>
-              <a:t>5/22/19</a:t>
+              <a:t>5/23/2019</a:t>
             </a:fld>
             <a:endParaRPr lang="en-US" dirty="0"/>
           </a:p>
@@ -18500,7 +18499,7 @@
           <a:p>
             <a:fld id="{4CD73815-2707-4475-8F1A-B873CB631BB4}" type="datetimeFigureOut">
               <a:rPr lang="en-US" smtClean="0"/>
-              <a:t>5/22/19</a:t>
+              <a:t>5/23/2019</a:t>
             </a:fld>
             <a:endParaRPr lang="en-US" dirty="0"/>
           </a:p>
@@ -18680,7 +18679,7 @@
           <a:p>
             <a:fld id="{2A4AFB99-0EAB-4182-AFF8-E214C82A68F6}" type="datetimeFigureOut">
               <a:rPr lang="en-US" smtClean="0"/>
-              <a:t>5/22/19</a:t>
+              <a:t>5/23/2019</a:t>
             </a:fld>
             <a:endParaRPr lang="en-US" dirty="0"/>
           </a:p>
@@ -18900,7 +18899,7 @@
           <a:p>
             <a:fld id="{A5D3794B-289A-4A80-97D7-111025398D45}" type="datetimeFigureOut">
               <a:rPr lang="en-US" smtClean="0"/>
-              <a:t>5/22/19</a:t>
+              <a:t>5/23/2019</a:t>
             </a:fld>
             <a:endParaRPr lang="en-US" dirty="0"/>
           </a:p>
@@ -22569,7 +22568,7 @@
           <a:p>
             <a:fld id="{5A61015F-7CC6-4D0A-9D87-873EA4C304CC}" type="datetimeFigureOut">
               <a:rPr lang="en-US" smtClean="0"/>
-              <a:t>5/22/19</a:t>
+              <a:t>5/23/2019</a:t>
             </a:fld>
             <a:endParaRPr lang="en-US" dirty="0"/>
           </a:p>
@@ -22841,7 +22840,7 @@
           <a:p>
             <a:fld id="{93C6A301-0538-44EC-B09D-202E1042A48B}" type="datetimeFigureOut">
               <a:rPr lang="en-US" smtClean="0"/>
-              <a:t>5/22/19</a:t>
+              <a:t>5/23/2019</a:t>
             </a:fld>
             <a:endParaRPr lang="en-US" dirty="0"/>
           </a:p>
@@ -23244,7 +23243,7 @@
           <a:p>
             <a:fld id="{D789574A-8875-45EF-8EA2-3CAA0F7ABC4C}" type="datetimeFigureOut">
               <a:rPr lang="en-US" smtClean="0"/>
-              <a:t>5/22/19</a:t>
+              <a:t>5/23/2019</a:t>
             </a:fld>
             <a:endParaRPr lang="en-US" dirty="0"/>
           </a:p>
@@ -23362,7 +23361,7 @@
           <a:p>
             <a:fld id="{67EF4D4C-5367-4C26-9E2B-D8088D7FCA81}" type="datetimeFigureOut">
               <a:rPr lang="en-US" smtClean="0"/>
-              <a:t>5/22/19</a:t>
+              <a:t>5/23/2019</a:t>
             </a:fld>
             <a:endParaRPr lang="en-US" dirty="0"/>
           </a:p>
@@ -23457,7 +23456,7 @@
           <a:p>
             <a:fld id="{56E91E96-98B0-4413-9547-46F3504108EF}" type="datetimeFigureOut">
               <a:rPr lang="en-US" smtClean="0"/>
-              <a:t>5/22/19</a:t>
+              <a:t>5/23/2019</a:t>
             </a:fld>
             <a:endParaRPr lang="en-US" dirty="0"/>
           </a:p>
@@ -23747,7 +23746,7 @@
           <a:p>
             <a:fld id="{05C68B11-C5A8-448C-8CE9-B1A273C79CFC}" type="datetimeFigureOut">
               <a:rPr lang="en-US" smtClean="0"/>
-              <a:t>5/22/19</a:t>
+              <a:t>5/23/2019</a:t>
             </a:fld>
             <a:endParaRPr lang="en-US" dirty="0"/>
           </a:p>
@@ -24027,7 +24026,7 @@
           <a:p>
             <a:fld id="{C7616CA0-919D-4A49-9C8A-62FDFB3A5183}" type="datetimeFigureOut">
               <a:rPr lang="en-US" smtClean="0"/>
-              <a:t>5/22/19</a:t>
+              <a:t>5/23/2019</a:t>
             </a:fld>
             <a:endParaRPr lang="en-US" dirty="0"/>
           </a:p>
@@ -24278,7 +24277,7 @@
             <a:fld id="{90298CD5-6C1E-4009-B41F-6DF62E31D3BE}" type="datetimeFigureOut">
               <a:rPr lang="en-US" smtClean="0"/>
               <a:pPr/>
-              <a:t>5/22/19</a:t>
+              <a:t>5/23/2019</a:t>
             </a:fld>
             <a:endParaRPr lang="en-US" dirty="0"/>
           </a:p>
@@ -25041,114 +25040,6 @@
 <file path=ppt/slides/slide2.xml><?xml version="1.0" encoding="utf-8"?>
 <p:sld xmlns:a="http://schemas.openxmlformats.org/drawingml/2006/main" xmlns:r="http://schemas.openxmlformats.org/officeDocument/2006/relationships" xmlns:p="http://schemas.openxmlformats.org/presentationml/2006/main">
   <p:cSld>
-    <p:spTree>
-      <p:nvGrpSpPr>
-        <p:cNvPr id="1" name=""/>
-        <p:cNvGrpSpPr/>
-        <p:nvPr/>
-      </p:nvGrpSpPr>
-      <p:grpSpPr>
-        <a:xfrm>
-          <a:off x="0" y="0"/>
-          <a:ext cx="0" cy="0"/>
-          <a:chOff x="0" y="0"/>
-          <a:chExt cx="0" cy="0"/>
-        </a:xfrm>
-      </p:grpSpPr>
-      <p:sp>
-        <p:nvSpPr>
-          <p:cNvPr id="3" name="Content Placeholder 2">
-            <a:extLst>
-              <a:ext uri="{FF2B5EF4-FFF2-40B4-BE49-F238E27FC236}">
-                <a16:creationId xmlns:a16="http://schemas.microsoft.com/office/drawing/2014/main" id="{A2EC865E-3129-4EE3-AC2E-7546CF6DDDED}"/>
-              </a:ext>
-            </a:extLst>
-          </p:cNvPr>
-          <p:cNvSpPr>
-            <a:spLocks noGrp="1"/>
-          </p:cNvSpPr>
-          <p:nvPr>
-            <p:ph idx="1"/>
-          </p:nvPr>
-        </p:nvSpPr>
-        <p:spPr>
-          <a:xfrm>
-            <a:off x="1024128" y="457200"/>
-            <a:ext cx="9720071" cy="5852160"/>
-          </a:xfrm>
-        </p:spPr>
-        <p:txBody>
-          <a:bodyPr/>
-          <a:lstStyle/>
-          <a:p>
-            <a:r>
-              <a:rPr lang="en-US" dirty="0"/>
-              <a:t>Project 2 Presentations:* 10 minute presentations* </a:t>
-            </a:r>
-          </a:p>
-          <a:p>
-            <a:r>
-              <a:rPr lang="en-US" dirty="0"/>
-              <a:t>Theme = Business Objectives (1-2 minutes)* </a:t>
-            </a:r>
-          </a:p>
-          <a:p>
-            <a:r>
-              <a:rPr lang="en-US" dirty="0"/>
-              <a:t>Data Munging Techniques (1-2 minutes)* </a:t>
-            </a:r>
-          </a:p>
-          <a:p>
-            <a:r>
-              <a:rPr lang="en-US" dirty="0"/>
-              <a:t>Coding Approach (1 minute)* </a:t>
-            </a:r>
-          </a:p>
-          <a:p>
-            <a:r>
-              <a:rPr lang="en-US" dirty="0"/>
-              <a:t>Data/App Architecture (1-2 minutes)* </a:t>
-            </a:r>
-          </a:p>
-          <a:p>
-            <a:r>
-              <a:rPr lang="en-US" dirty="0"/>
-              <a:t>Final Interactive Visualization (2-4 minutes) - Live Demos - Annotated Screenshots (for backup and storytelling)* </a:t>
-            </a:r>
-          </a:p>
-          <a:p>
-            <a:r>
-              <a:rPr lang="en-US" dirty="0"/>
-              <a:t>Future Work (30 seconds)* </a:t>
-            </a:r>
-          </a:p>
-          <a:p>
-            <a:r>
-              <a:rPr lang="en-US" dirty="0"/>
-              <a:t>Appendix - Additional visualizations - Interesting insights not included in story</a:t>
-            </a:r>
-          </a:p>
-          <a:p>
-            <a:endParaRPr lang="en-US" dirty="0"/>
-          </a:p>
-        </p:txBody>
-      </p:sp>
-    </p:spTree>
-    <p:extLst>
-      <p:ext uri="{BB962C8B-B14F-4D97-AF65-F5344CB8AC3E}">
-        <p14:creationId xmlns:p14="http://schemas.microsoft.com/office/powerpoint/2010/main" val="187637280"/>
-      </p:ext>
-    </p:extLst>
-  </p:cSld>
-  <p:clrMapOvr>
-    <a:masterClrMapping/>
-  </p:clrMapOvr>
-</p:sld>
-</file>
-
-<file path=ppt/slides/slide3.xml><?xml version="1.0" encoding="utf-8"?>
-<p:sld xmlns:a="http://schemas.openxmlformats.org/drawingml/2006/main" xmlns:r="http://schemas.openxmlformats.org/officeDocument/2006/relationships" xmlns:p="http://schemas.openxmlformats.org/presentationml/2006/main">
-  <p:cSld>
     <p:bg>
       <p:bgPr>
         <a:solidFill>
@@ -25402,7 +25293,7 @@
 </p:sld>
 </file>
 
-<file path=ppt/slides/slide4.xml><?xml version="1.0" encoding="utf-8"?>
+<file path=ppt/slides/slide3.xml><?xml version="1.0" encoding="utf-8"?>
 <p:sld xmlns:a="http://schemas.openxmlformats.org/drawingml/2006/main" xmlns:r="http://schemas.openxmlformats.org/officeDocument/2006/relationships" xmlns:p="http://schemas.openxmlformats.org/presentationml/2006/main">
   <p:cSld>
     <p:bg>
@@ -25573,7 +25464,7 @@
 </p:sld>
 </file>
 
-<file path=ppt/slides/slide5.xml><?xml version="1.0" encoding="utf-8"?>
+<file path=ppt/slides/slide4.xml><?xml version="1.0" encoding="utf-8"?>
 <p:sld xmlns:a="http://schemas.openxmlformats.org/drawingml/2006/main" xmlns:r="http://schemas.openxmlformats.org/officeDocument/2006/relationships" xmlns:p="http://schemas.openxmlformats.org/presentationml/2006/main">
   <p:cSld>
     <p:bg>
@@ -26224,7 +26115,7 @@
 </p:sld>
 </file>
 
-<file path=ppt/slides/slide6.xml><?xml version="1.0" encoding="utf-8"?>
+<file path=ppt/slides/slide5.xml><?xml version="1.0" encoding="utf-8"?>
 <p:sld xmlns:a="http://schemas.openxmlformats.org/drawingml/2006/main" xmlns:r="http://schemas.openxmlformats.org/officeDocument/2006/relationships" xmlns:p="http://schemas.openxmlformats.org/presentationml/2006/main">
   <p:cSld>
     <p:bg>
@@ -26395,7 +26286,7 @@
 </p:sld>
 </file>
 
-<file path=ppt/slides/slide7.xml><?xml version="1.0" encoding="utf-8"?>
+<file path=ppt/slides/slide6.xml><?xml version="1.0" encoding="utf-8"?>
 <p:sld xmlns:a="http://schemas.openxmlformats.org/drawingml/2006/main" xmlns:r="http://schemas.openxmlformats.org/officeDocument/2006/relationships" xmlns:p="http://schemas.openxmlformats.org/presentationml/2006/main">
   <p:cSld>
     <p:bg>
@@ -30211,7 +30102,7 @@
 </p:sld>
 </file>
 
-<file path=ppt/slides/slide8.xml><?xml version="1.0" encoding="utf-8"?>
+<file path=ppt/slides/slide7.xml><?xml version="1.0" encoding="utf-8"?>
 <p:sld xmlns:a="http://schemas.openxmlformats.org/drawingml/2006/main" xmlns:r="http://schemas.openxmlformats.org/officeDocument/2006/relationships" xmlns:p="http://schemas.openxmlformats.org/presentationml/2006/main">
   <p:cSld>
     <p:bg>

</xml_diff>